<commit_message>
Garcon: * Update to the newest version. (Replaced the old completelly)
</commit_message>
<xml_diff>
--- a/garcon/Docs/LIME Garcon.pptx
+++ b/garcon/Docs/LIME Garcon.pptx
@@ -109,6 +109,11 @@
       </a:defRPr>
     </a:lvl9pPr>
   </p:defaultTextStyle>
+  <p:extLst>
+    <p:ext uri="{EFAFB233-063F-42B5-8137-9DF3F51BA10A}">
+      <p15:sldGuideLst xmlns:p15="http://schemas.microsoft.com/office/powerpoint/2012/main"/>
+    </p:ext>
+  </p:extLst>
 </p:presentation>
 </file>
 
@@ -243,7 +248,7 @@
           <a:p>
             <a:fld id="{B169D51E-3F43-40AB-AA2C-635C044C025B}" type="datetimeFigureOut">
               <a:rPr lang="sv-SE" smtClean="0"/>
-              <a:t>2015-02-13</a:t>
+              <a:t>2015-10-16</a:t>
             </a:fld>
             <a:endParaRPr lang="sv-SE"/>
           </a:p>
@@ -413,7 +418,7 @@
           <a:p>
             <a:fld id="{B169D51E-3F43-40AB-AA2C-635C044C025B}" type="datetimeFigureOut">
               <a:rPr lang="sv-SE" smtClean="0"/>
-              <a:t>2015-02-13</a:t>
+              <a:t>2015-10-16</a:t>
             </a:fld>
             <a:endParaRPr lang="sv-SE"/>
           </a:p>
@@ -593,7 +598,7 @@
           <a:p>
             <a:fld id="{B169D51E-3F43-40AB-AA2C-635C044C025B}" type="datetimeFigureOut">
               <a:rPr lang="sv-SE" smtClean="0"/>
-              <a:t>2015-02-13</a:t>
+              <a:t>2015-10-16</a:t>
             </a:fld>
             <a:endParaRPr lang="sv-SE"/>
           </a:p>
@@ -763,7 +768,7 @@
           <a:p>
             <a:fld id="{B169D51E-3F43-40AB-AA2C-635C044C025B}" type="datetimeFigureOut">
               <a:rPr lang="sv-SE" smtClean="0"/>
-              <a:t>2015-02-13</a:t>
+              <a:t>2015-10-16</a:t>
             </a:fld>
             <a:endParaRPr lang="sv-SE"/>
           </a:p>
@@ -1007,7 +1012,7 @@
           <a:p>
             <a:fld id="{B169D51E-3F43-40AB-AA2C-635C044C025B}" type="datetimeFigureOut">
               <a:rPr lang="sv-SE" smtClean="0"/>
-              <a:t>2015-02-13</a:t>
+              <a:t>2015-10-16</a:t>
             </a:fld>
             <a:endParaRPr lang="sv-SE"/>
           </a:p>
@@ -1239,7 +1244,7 @@
           <a:p>
             <a:fld id="{B169D51E-3F43-40AB-AA2C-635C044C025B}" type="datetimeFigureOut">
               <a:rPr lang="sv-SE" smtClean="0"/>
-              <a:t>2015-02-13</a:t>
+              <a:t>2015-10-16</a:t>
             </a:fld>
             <a:endParaRPr lang="sv-SE"/>
           </a:p>
@@ -1606,7 +1611,7 @@
           <a:p>
             <a:fld id="{B169D51E-3F43-40AB-AA2C-635C044C025B}" type="datetimeFigureOut">
               <a:rPr lang="sv-SE" smtClean="0"/>
-              <a:t>2015-02-13</a:t>
+              <a:t>2015-10-16</a:t>
             </a:fld>
             <a:endParaRPr lang="sv-SE"/>
           </a:p>
@@ -1724,7 +1729,7 @@
           <a:p>
             <a:fld id="{B169D51E-3F43-40AB-AA2C-635C044C025B}" type="datetimeFigureOut">
               <a:rPr lang="sv-SE" smtClean="0"/>
-              <a:t>2015-02-13</a:t>
+              <a:t>2015-10-16</a:t>
             </a:fld>
             <a:endParaRPr lang="sv-SE"/>
           </a:p>
@@ -1819,7 +1824,7 @@
           <a:p>
             <a:fld id="{B169D51E-3F43-40AB-AA2C-635C044C025B}" type="datetimeFigureOut">
               <a:rPr lang="sv-SE" smtClean="0"/>
-              <a:t>2015-02-13</a:t>
+              <a:t>2015-10-16</a:t>
             </a:fld>
             <a:endParaRPr lang="sv-SE"/>
           </a:p>
@@ -2096,7 +2101,7 @@
           <a:p>
             <a:fld id="{B169D51E-3F43-40AB-AA2C-635C044C025B}" type="datetimeFigureOut">
               <a:rPr lang="sv-SE" smtClean="0"/>
-              <a:t>2015-02-13</a:t>
+              <a:t>2015-10-16</a:t>
             </a:fld>
             <a:endParaRPr lang="sv-SE"/>
           </a:p>
@@ -2353,7 +2358,7 @@
           <a:p>
             <a:fld id="{B169D51E-3F43-40AB-AA2C-635C044C025B}" type="datetimeFigureOut">
               <a:rPr lang="sv-SE" smtClean="0"/>
-              <a:t>2015-02-13</a:t>
+              <a:t>2015-10-16</a:t>
             </a:fld>
             <a:endParaRPr lang="sv-SE"/>
           </a:p>
@@ -2566,7 +2571,7 @@
           <a:p>
             <a:fld id="{B169D51E-3F43-40AB-AA2C-635C044C025B}" type="datetimeFigureOut">
               <a:rPr lang="sv-SE" smtClean="0"/>
-              <a:t>2015-02-13</a:t>
+              <a:t>2015-10-16</a:t>
             </a:fld>
             <a:endParaRPr lang="sv-SE"/>
           </a:p>
@@ -4204,11 +4209,11 @@
   <p:clrMapOvr>
     <a:masterClrMapping/>
   </p:clrMapOvr>
-  <mc:AlternateContent xmlns:mc="http://schemas.openxmlformats.org/markup-compatibility/2006">
-    <mc:Choice xmlns:p14="http://schemas.microsoft.com/office/powerpoint/2010/main" Requires="p14">
+  <mc:AlternateContent xmlns:mc="http://schemas.openxmlformats.org/markup-compatibility/2006" xmlns:p14="http://schemas.microsoft.com/office/powerpoint/2010/main">
+    <mc:Choice Requires="p14">
       <p:transition p14:dur="0"/>
     </mc:Choice>
-    <mc:Fallback>
+    <mc:Fallback xmlns="">
       <p:transition/>
     </mc:Fallback>
   </mc:AlternateContent>
@@ -4851,11 +4856,11 @@
   <p:clrMapOvr>
     <a:masterClrMapping/>
   </p:clrMapOvr>
-  <mc:AlternateContent xmlns:mc="http://schemas.openxmlformats.org/markup-compatibility/2006">
-    <mc:Choice xmlns:p14="http://schemas.microsoft.com/office/powerpoint/2010/main" Requires="p14">
+  <mc:AlternateContent xmlns:mc="http://schemas.openxmlformats.org/markup-compatibility/2006" xmlns:p14="http://schemas.microsoft.com/office/powerpoint/2010/main">
+    <mc:Choice Requires="p14">
       <p:transition p14:dur="0"/>
     </mc:Choice>
-    <mc:Fallback>
+    <mc:Fallback xmlns="">
       <p:transition/>
     </mc:Fallback>
   </mc:AlternateContent>
@@ -5351,13 +5356,13 @@
   <p:clrMapOvr>
     <a:masterClrMapping/>
   </p:clrMapOvr>
-  <mc:AlternateContent xmlns:mc="http://schemas.openxmlformats.org/markup-compatibility/2006">
-    <mc:Choice xmlns:p14="http://schemas.microsoft.com/office/powerpoint/2010/main" Requires="p14">
+  <mc:AlternateContent xmlns:mc="http://schemas.openxmlformats.org/markup-compatibility/2006" xmlns:p14="http://schemas.microsoft.com/office/powerpoint/2010/main">
+    <mc:Choice Requires="p14">
       <p:transition spd="med" p14:dur="700">
         <p:fade/>
       </p:transition>
     </mc:Choice>
-    <mc:Fallback>
+    <mc:Fallback xmlns="">
       <p:transition spd="med">
         <p:fade/>
       </p:transition>
@@ -5775,30 +5780,6 @@
           </a:p>
         </p:txBody>
       </p:sp>
-      <p:pic>
-        <p:nvPicPr>
-          <p:cNvPr id="2" name="Bildobjekt 1"/>
-          <p:cNvPicPr>
-            <a:picLocks noChangeAspect="1"/>
-          </p:cNvPicPr>
-          <p:nvPr/>
-        </p:nvPicPr>
-        <p:blipFill>
-          <a:blip r:embed="rId3"/>
-          <a:stretch>
-            <a:fillRect/>
-          </a:stretch>
-        </p:blipFill>
-        <p:spPr>
-          <a:xfrm>
-            <a:off x="476250" y="1849578"/>
-            <a:ext cx="8248650" cy="7591425"/>
-          </a:xfrm>
-          <a:prstGeom prst="rect">
-            <a:avLst/>
-          </a:prstGeom>
-        </p:spPr>
-      </p:pic>
       <p:sp>
         <p:nvSpPr>
           <p:cNvPr id="3" name="Rektangel 2"/>
@@ -5845,6 +5826,30 @@
           </a:p>
         </p:txBody>
       </p:sp>
+      <p:pic>
+        <p:nvPicPr>
+          <p:cNvPr id="6" name="Picture 5"/>
+          <p:cNvPicPr>
+            <a:picLocks noChangeAspect="1"/>
+          </p:cNvPicPr>
+          <p:nvPr/>
+        </p:nvPicPr>
+        <p:blipFill>
+          <a:blip r:embed="rId3"/>
+          <a:stretch>
+            <a:fillRect/>
+          </a:stretch>
+        </p:blipFill>
+        <p:spPr>
+          <a:xfrm>
+            <a:off x="623451" y="1600769"/>
+            <a:ext cx="7626576" cy="6275498"/>
+          </a:xfrm>
+          <a:prstGeom prst="rect">
+            <a:avLst/>
+          </a:prstGeom>
+        </p:spPr>
+      </p:pic>
     </p:spTree>
     <p:extLst>
       <p:ext uri="{BB962C8B-B14F-4D97-AF65-F5344CB8AC3E}">
@@ -5855,13 +5860,13 @@
   <p:clrMapOvr>
     <a:masterClrMapping/>
   </p:clrMapOvr>
-  <mc:AlternateContent xmlns:mc="http://schemas.openxmlformats.org/markup-compatibility/2006">
-    <mc:Choice xmlns:p14="http://schemas.microsoft.com/office/powerpoint/2010/main" Requires="p14">
+  <mc:AlternateContent xmlns:mc="http://schemas.openxmlformats.org/markup-compatibility/2006" xmlns:p14="http://schemas.microsoft.com/office/powerpoint/2010/main">
+    <mc:Choice Requires="p14">
       <p:transition spd="med" p14:dur="700">
         <p:fade/>
       </p:transition>
     </mc:Choice>
-    <mc:Fallback>
+    <mc:Fallback xmlns="">
       <p:transition spd="med">
         <p:fade/>
       </p:transition>

</xml_diff>